<commit_message>
added DesignBites to buildon presentation
</commit_message>
<xml_diff>
--- a/Build-On-2.pptx
+++ b/Build-On-2.pptx
@@ -5164,29 +5164,41 @@
             <a:endParaRPr lang="en-US" dirty="0"/>
           </a:p>
           <a:p>
-            <a:r>
-              <a:rPr lang="en-US" dirty="0">
+            <a:pPr lvl="1"/>
+            <a:r>
+              <a:rPr lang="en-US" dirty="0" err="1">
                 <a:hlinkClick r:id="rId3"/>
               </a:rPr>
-              <a:t>Step #1</a:t>
-            </a:r>
-            <a:r>
-              <a:rPr lang="en-US" dirty="0"/>
-              <a:t> - </a:t>
-            </a:r>
-            <a:r>
-              <a:rPr lang="en-US" dirty="0" err="1"/>
-              <a:t>TextSearch</a:t>
+              <a:t>DesignBites</a:t>
+            </a:r>
+            <a:r>
+              <a:rPr lang="en-US" err="1">
+                <a:hlinkClick r:id="rId3"/>
+              </a:rPr>
+              <a:t>_</a:t>
+            </a:r>
+            <a:r>
+              <a:rPr lang="en-US">
+                <a:hlinkClick r:id="rId3"/>
+              </a:rPr>
+              <a:t>Intro</a:t>
             </a:r>
             <a:endParaRPr lang="en-US" dirty="0"/>
           </a:p>
           <a:p>
-            <a:pPr lvl="1"/>
             <a:r>
               <a:rPr lang="en-US" dirty="0">
                 <a:hlinkClick r:id="rId4"/>
               </a:rPr>
-              <a:t>Starter Code</a:t>
+              <a:t>Step #1</a:t>
+            </a:r>
+            <a:r>
+              <a:rPr lang="en-US" dirty="0"/>
+              <a:t> - </a:t>
+            </a:r>
+            <a:r>
+              <a:rPr lang="en-US" dirty="0" err="1"/>
+              <a:t>TextSearch</a:t>
             </a:r>
             <a:endParaRPr lang="en-US" dirty="0"/>
           </a:p>
@@ -5196,7 +5208,7 @@
               <a:rPr lang="en-US" dirty="0">
                 <a:hlinkClick r:id="rId5"/>
               </a:rPr>
-              <a:t>Tooling</a:t>
+              <a:t>Starter Code</a:t>
             </a:r>
             <a:endParaRPr lang="en-US" dirty="0"/>
           </a:p>
@@ -5206,7 +5218,7 @@
               <a:rPr lang="en-US" dirty="0">
                 <a:hlinkClick r:id="rId6"/>
               </a:rPr>
-              <a:t>Functions</a:t>
+              <a:t>Tooling</a:t>
             </a:r>
             <a:endParaRPr lang="en-US" dirty="0"/>
           </a:p>
@@ -5216,17 +5228,17 @@
               <a:rPr lang="en-US" dirty="0">
                 <a:hlinkClick r:id="rId7"/>
               </a:rPr>
-              <a:t>Structs</a:t>
-            </a:r>
-            <a:endParaRPr lang="en-US" dirty="0"/>
-          </a:p>
-          <a:p>
-            <a:pPr lvl="1"/>
-            <a:r>
-              <a:rPr lang="en-US" dirty="0" err="1">
+              <a:t>Functions</a:t>
+            </a:r>
+            <a:r>
+              <a:rPr lang="en-US" dirty="0"/>
+              <a:t>, </a:t>
+            </a:r>
+            <a:r>
+              <a:rPr lang="en-US" dirty="0">
                 <a:hlinkClick r:id="rId8"/>
               </a:rPr>
-              <a:t>RustStory_Libraries.html#fs</a:t>
+              <a:t>Structs</a:t>
             </a:r>
             <a:endParaRPr lang="en-US" dirty="0"/>
           </a:p>
@@ -5236,15 +5248,25 @@
               <a:rPr lang="en-US" dirty="0" err="1">
                 <a:hlinkClick r:id="rId9"/>
               </a:rPr>
-              <a:t>std:fs</a:t>
+              <a:t>RustStory_Libraries.html#fs</a:t>
             </a:r>
             <a:endParaRPr lang="en-US" dirty="0"/>
           </a:p>
           <a:p>
+            <a:pPr lvl="1"/>
             <a:r>
               <a:rPr lang="en-US" dirty="0" err="1">
                 <a:hlinkClick r:id="rId10"/>
               </a:rPr>
+              <a:t>std:fs</a:t>
+            </a:r>
+            <a:endParaRPr lang="en-US" dirty="0"/>
+          </a:p>
+          <a:p>
+            <a:r>
+              <a:rPr lang="en-US" dirty="0" err="1">
+                <a:hlinkClick r:id="rId11"/>
+              </a:rPr>
               <a:t>BuildOn</a:t>
             </a:r>
             <a:endParaRPr lang="en-US" dirty="0"/>
@@ -5258,9 +5280,6 @@
               <a:rPr lang="en-US" dirty="0" err="1"/>
               <a:t>TextFinder</a:t>
             </a:r>
-            <a:endParaRPr lang="en-US" dirty="0"/>
-          </a:p>
-          <a:p>
             <a:endParaRPr lang="en-US" dirty="0"/>
           </a:p>
           <a:p>
@@ -5268,7 +5287,7 @@
               <a:buNone/>
             </a:pPr>
             <a:endParaRPr lang="en-US" dirty="0">
-              <a:hlinkClick r:id="rId11"/>
+              <a:hlinkClick r:id="rId12"/>
             </a:endParaRPr>
           </a:p>
         </p:txBody>
@@ -5349,18 +5368,18 @@
           <a:p>
             <a:r>
               <a:rPr lang="en-US" dirty="0" err="1">
-                <a:hlinkClick r:id="rId12"/>
+                <a:hlinkClick r:id="rId13"/>
               </a:rPr>
               <a:t>RustBite_Data</a:t>
             </a:r>
             <a:endParaRPr lang="en-US" dirty="0">
-              <a:hlinkClick r:id="rId13"/>
+              <a:hlinkClick r:id="rId14"/>
             </a:endParaRPr>
           </a:p>
           <a:p>
             <a:r>
               <a:rPr lang="en-US" dirty="0">
-                <a:hlinkClick r:id="rId13"/>
+                <a:hlinkClick r:id="rId14"/>
               </a:rPr>
               <a:t>Safety</a:t>
             </a:r>
@@ -5369,29 +5388,20 @@
           <a:p>
             <a:r>
               <a:rPr lang="en-US" dirty="0" err="1">
-                <a:hlinkClick r:id="rId14"/>
+                <a:hlinkClick r:id="rId15"/>
               </a:rPr>
               <a:t>Anim_Features</a:t>
             </a:r>
             <a:endParaRPr lang="en-US" dirty="0">
-              <a:hlinkClick r:id="rId15" action="ppaction://hlinkfile"/>
+              <a:hlinkClick r:id="rId16" action="ppaction://hlinkfile"/>
             </a:endParaRPr>
-          </a:p>
-          <a:p>
-            <a:r>
-              <a:rPr lang="en-US" dirty="0">
-                <a:hlinkClick r:id="rId16"/>
-              </a:rPr>
-              <a:t>Rust Bites</a:t>
-            </a:r>
-            <a:endParaRPr lang="en-US" dirty="0"/>
           </a:p>
           <a:p>
             <a:r>
               <a:rPr lang="en-US" dirty="0">
                 <a:hlinkClick r:id="rId17"/>
               </a:rPr>
-              <a:t>Rust Story</a:t>
+              <a:t>Rust Bites</a:t>
             </a:r>
             <a:endParaRPr lang="en-US" dirty="0"/>
           </a:p>
@@ -5399,6 +5409,15 @@
             <a:r>
               <a:rPr lang="en-US" dirty="0">
                 <a:hlinkClick r:id="rId18"/>
+              </a:rPr>
+              <a:t>Rust Story</a:t>
+            </a:r>
+            <a:endParaRPr lang="en-US" dirty="0"/>
+          </a:p>
+          <a:p>
+            <a:r>
+              <a:rPr lang="en-US" dirty="0">
+                <a:hlinkClick r:id="rId19"/>
               </a:rPr>
               <a:t>Code Experiments</a:t>
             </a:r>

</xml_diff>